<commit_message>
Added 2026 conference details
</commit_message>
<xml_diff>
--- a/uploads/kurios.pptx
+++ b/uploads/kurios.pptx
@@ -5,7 +5,7 @@
     <p:sldMasterId id="2147483660" r:id="rId1"/>
   </p:sldMasterIdLst>
   <p:sldIdLst>
-    <p:sldId id="257" r:id="rId2"/>
+    <p:sldId id="256" r:id="rId2"/>
   </p:sldIdLst>
   <p:sldSz cx="9144000" cy="6858000" type="screen4x3"/>
   <p:notesSz cx="6858000" cy="9144000"/>
@@ -241,9 +241,9 @@
           <a:bodyPr/>
           <a:lstStyle/>
           <a:p>
-            <a:fld id="{CED249A8-BC37-4AAA-8F05-A3B38DD5A3A3}" type="datetimeFigureOut">
+            <a:fld id="{EC93B6FF-5EEF-4B9E-9617-9E03604E1B7D}" type="datetimeFigureOut">
               <a:rPr lang="en-ZA" smtClean="0"/>
-              <a:t>2024/07/07</a:t>
+              <a:t>2025/02/04</a:t>
             </a:fld>
             <a:endParaRPr lang="en-ZA"/>
           </a:p>
@@ -283,7 +283,7 @@
           <a:bodyPr/>
           <a:lstStyle/>
           <a:p>
-            <a:fld id="{E1F98151-497C-4309-A4DD-995DA316A740}" type="slidenum">
+            <a:fld id="{60F2D963-3578-461F-9A93-1ACC367E1CB4}" type="slidenum">
               <a:rPr lang="en-ZA" smtClean="0"/>
               <a:t>‹#›</a:t>
             </a:fld>
@@ -294,7 +294,7 @@
     </p:spTree>
     <p:extLst>
       <p:ext uri="{BB962C8B-B14F-4D97-AF65-F5344CB8AC3E}">
-        <p14:creationId xmlns:p14="http://schemas.microsoft.com/office/powerpoint/2010/main" val="1217680573"/>
+        <p14:creationId xmlns:p14="http://schemas.microsoft.com/office/powerpoint/2010/main" val="4131089775"/>
       </p:ext>
     </p:extLst>
   </p:cSld>
@@ -411,9 +411,9 @@
           <a:bodyPr/>
           <a:lstStyle/>
           <a:p>
-            <a:fld id="{CED249A8-BC37-4AAA-8F05-A3B38DD5A3A3}" type="datetimeFigureOut">
+            <a:fld id="{EC93B6FF-5EEF-4B9E-9617-9E03604E1B7D}" type="datetimeFigureOut">
               <a:rPr lang="en-ZA" smtClean="0"/>
-              <a:t>2024/07/07</a:t>
+              <a:t>2025/02/04</a:t>
             </a:fld>
             <a:endParaRPr lang="en-ZA"/>
           </a:p>
@@ -453,7 +453,7 @@
           <a:bodyPr/>
           <a:lstStyle/>
           <a:p>
-            <a:fld id="{E1F98151-497C-4309-A4DD-995DA316A740}" type="slidenum">
+            <a:fld id="{60F2D963-3578-461F-9A93-1ACC367E1CB4}" type="slidenum">
               <a:rPr lang="en-ZA" smtClean="0"/>
               <a:t>‹#›</a:t>
             </a:fld>
@@ -464,7 +464,7 @@
     </p:spTree>
     <p:extLst>
       <p:ext uri="{BB962C8B-B14F-4D97-AF65-F5344CB8AC3E}">
-        <p14:creationId xmlns:p14="http://schemas.microsoft.com/office/powerpoint/2010/main" val="84264205"/>
+        <p14:creationId xmlns:p14="http://schemas.microsoft.com/office/powerpoint/2010/main" val="1814620640"/>
       </p:ext>
     </p:extLst>
   </p:cSld>
@@ -591,9 +591,9 @@
           <a:bodyPr/>
           <a:lstStyle/>
           <a:p>
-            <a:fld id="{CED249A8-BC37-4AAA-8F05-A3B38DD5A3A3}" type="datetimeFigureOut">
+            <a:fld id="{EC93B6FF-5EEF-4B9E-9617-9E03604E1B7D}" type="datetimeFigureOut">
               <a:rPr lang="en-ZA" smtClean="0"/>
-              <a:t>2024/07/07</a:t>
+              <a:t>2025/02/04</a:t>
             </a:fld>
             <a:endParaRPr lang="en-ZA"/>
           </a:p>
@@ -633,7 +633,7 @@
           <a:bodyPr/>
           <a:lstStyle/>
           <a:p>
-            <a:fld id="{E1F98151-497C-4309-A4DD-995DA316A740}" type="slidenum">
+            <a:fld id="{60F2D963-3578-461F-9A93-1ACC367E1CB4}" type="slidenum">
               <a:rPr lang="en-ZA" smtClean="0"/>
               <a:t>‹#›</a:t>
             </a:fld>
@@ -644,7 +644,7 @@
     </p:spTree>
     <p:extLst>
       <p:ext uri="{BB962C8B-B14F-4D97-AF65-F5344CB8AC3E}">
-        <p14:creationId xmlns:p14="http://schemas.microsoft.com/office/powerpoint/2010/main" val="1152697080"/>
+        <p14:creationId xmlns:p14="http://schemas.microsoft.com/office/powerpoint/2010/main" val="2756668298"/>
       </p:ext>
     </p:extLst>
   </p:cSld>
@@ -761,9 +761,9 @@
           <a:bodyPr/>
           <a:lstStyle/>
           <a:p>
-            <a:fld id="{CED249A8-BC37-4AAA-8F05-A3B38DD5A3A3}" type="datetimeFigureOut">
+            <a:fld id="{EC93B6FF-5EEF-4B9E-9617-9E03604E1B7D}" type="datetimeFigureOut">
               <a:rPr lang="en-ZA" smtClean="0"/>
-              <a:t>2024/07/07</a:t>
+              <a:t>2025/02/04</a:t>
             </a:fld>
             <a:endParaRPr lang="en-ZA"/>
           </a:p>
@@ -803,7 +803,7 @@
           <a:bodyPr/>
           <a:lstStyle/>
           <a:p>
-            <a:fld id="{E1F98151-497C-4309-A4DD-995DA316A740}" type="slidenum">
+            <a:fld id="{60F2D963-3578-461F-9A93-1ACC367E1CB4}" type="slidenum">
               <a:rPr lang="en-ZA" smtClean="0"/>
               <a:t>‹#›</a:t>
             </a:fld>
@@ -814,7 +814,7 @@
     </p:spTree>
     <p:extLst>
       <p:ext uri="{BB962C8B-B14F-4D97-AF65-F5344CB8AC3E}">
-        <p14:creationId xmlns:p14="http://schemas.microsoft.com/office/powerpoint/2010/main" val="2101328696"/>
+        <p14:creationId xmlns:p14="http://schemas.microsoft.com/office/powerpoint/2010/main" val="234229724"/>
       </p:ext>
     </p:extLst>
   </p:cSld>
@@ -1005,9 +1005,9 @@
           <a:bodyPr/>
           <a:lstStyle/>
           <a:p>
-            <a:fld id="{CED249A8-BC37-4AAA-8F05-A3B38DD5A3A3}" type="datetimeFigureOut">
+            <a:fld id="{EC93B6FF-5EEF-4B9E-9617-9E03604E1B7D}" type="datetimeFigureOut">
               <a:rPr lang="en-ZA" smtClean="0"/>
-              <a:t>2024/07/07</a:t>
+              <a:t>2025/02/04</a:t>
             </a:fld>
             <a:endParaRPr lang="en-ZA"/>
           </a:p>
@@ -1047,7 +1047,7 @@
           <a:bodyPr/>
           <a:lstStyle/>
           <a:p>
-            <a:fld id="{E1F98151-497C-4309-A4DD-995DA316A740}" type="slidenum">
+            <a:fld id="{60F2D963-3578-461F-9A93-1ACC367E1CB4}" type="slidenum">
               <a:rPr lang="en-ZA" smtClean="0"/>
               <a:t>‹#›</a:t>
             </a:fld>
@@ -1058,7 +1058,7 @@
     </p:spTree>
     <p:extLst>
       <p:ext uri="{BB962C8B-B14F-4D97-AF65-F5344CB8AC3E}">
-        <p14:creationId xmlns:p14="http://schemas.microsoft.com/office/powerpoint/2010/main" val="917318313"/>
+        <p14:creationId xmlns:p14="http://schemas.microsoft.com/office/powerpoint/2010/main" val="1447503902"/>
       </p:ext>
     </p:extLst>
   </p:cSld>
@@ -1237,9 +1237,9 @@
           <a:bodyPr/>
           <a:lstStyle/>
           <a:p>
-            <a:fld id="{CED249A8-BC37-4AAA-8F05-A3B38DD5A3A3}" type="datetimeFigureOut">
+            <a:fld id="{EC93B6FF-5EEF-4B9E-9617-9E03604E1B7D}" type="datetimeFigureOut">
               <a:rPr lang="en-ZA" smtClean="0"/>
-              <a:t>2024/07/07</a:t>
+              <a:t>2025/02/04</a:t>
             </a:fld>
             <a:endParaRPr lang="en-ZA"/>
           </a:p>
@@ -1279,7 +1279,7 @@
           <a:bodyPr/>
           <a:lstStyle/>
           <a:p>
-            <a:fld id="{E1F98151-497C-4309-A4DD-995DA316A740}" type="slidenum">
+            <a:fld id="{60F2D963-3578-461F-9A93-1ACC367E1CB4}" type="slidenum">
               <a:rPr lang="en-ZA" smtClean="0"/>
               <a:t>‹#›</a:t>
             </a:fld>
@@ -1290,7 +1290,7 @@
     </p:spTree>
     <p:extLst>
       <p:ext uri="{BB962C8B-B14F-4D97-AF65-F5344CB8AC3E}">
-        <p14:creationId xmlns:p14="http://schemas.microsoft.com/office/powerpoint/2010/main" val="3447003441"/>
+        <p14:creationId xmlns:p14="http://schemas.microsoft.com/office/powerpoint/2010/main" val="2511068739"/>
       </p:ext>
     </p:extLst>
   </p:cSld>
@@ -1604,9 +1604,9 @@
           <a:bodyPr/>
           <a:lstStyle/>
           <a:p>
-            <a:fld id="{CED249A8-BC37-4AAA-8F05-A3B38DD5A3A3}" type="datetimeFigureOut">
+            <a:fld id="{EC93B6FF-5EEF-4B9E-9617-9E03604E1B7D}" type="datetimeFigureOut">
               <a:rPr lang="en-ZA" smtClean="0"/>
-              <a:t>2024/07/07</a:t>
+              <a:t>2025/02/04</a:t>
             </a:fld>
             <a:endParaRPr lang="en-ZA"/>
           </a:p>
@@ -1646,7 +1646,7 @@
           <a:bodyPr/>
           <a:lstStyle/>
           <a:p>
-            <a:fld id="{E1F98151-497C-4309-A4DD-995DA316A740}" type="slidenum">
+            <a:fld id="{60F2D963-3578-461F-9A93-1ACC367E1CB4}" type="slidenum">
               <a:rPr lang="en-ZA" smtClean="0"/>
               <a:t>‹#›</a:t>
             </a:fld>
@@ -1657,7 +1657,7 @@
     </p:spTree>
     <p:extLst>
       <p:ext uri="{BB962C8B-B14F-4D97-AF65-F5344CB8AC3E}">
-        <p14:creationId xmlns:p14="http://schemas.microsoft.com/office/powerpoint/2010/main" val="793851574"/>
+        <p14:creationId xmlns:p14="http://schemas.microsoft.com/office/powerpoint/2010/main" val="3170955788"/>
       </p:ext>
     </p:extLst>
   </p:cSld>
@@ -1722,9 +1722,9 @@
           <a:bodyPr/>
           <a:lstStyle/>
           <a:p>
-            <a:fld id="{CED249A8-BC37-4AAA-8F05-A3B38DD5A3A3}" type="datetimeFigureOut">
+            <a:fld id="{EC93B6FF-5EEF-4B9E-9617-9E03604E1B7D}" type="datetimeFigureOut">
               <a:rPr lang="en-ZA" smtClean="0"/>
-              <a:t>2024/07/07</a:t>
+              <a:t>2025/02/04</a:t>
             </a:fld>
             <a:endParaRPr lang="en-ZA"/>
           </a:p>
@@ -1764,7 +1764,7 @@
           <a:bodyPr/>
           <a:lstStyle/>
           <a:p>
-            <a:fld id="{E1F98151-497C-4309-A4DD-995DA316A740}" type="slidenum">
+            <a:fld id="{60F2D963-3578-461F-9A93-1ACC367E1CB4}" type="slidenum">
               <a:rPr lang="en-ZA" smtClean="0"/>
               <a:t>‹#›</a:t>
             </a:fld>
@@ -1775,7 +1775,7 @@
     </p:spTree>
     <p:extLst>
       <p:ext uri="{BB962C8B-B14F-4D97-AF65-F5344CB8AC3E}">
-        <p14:creationId xmlns:p14="http://schemas.microsoft.com/office/powerpoint/2010/main" val="4035946829"/>
+        <p14:creationId xmlns:p14="http://schemas.microsoft.com/office/powerpoint/2010/main" val="2677737850"/>
       </p:ext>
     </p:extLst>
   </p:cSld>
@@ -1817,9 +1817,9 @@
           <a:bodyPr/>
           <a:lstStyle/>
           <a:p>
-            <a:fld id="{CED249A8-BC37-4AAA-8F05-A3B38DD5A3A3}" type="datetimeFigureOut">
+            <a:fld id="{EC93B6FF-5EEF-4B9E-9617-9E03604E1B7D}" type="datetimeFigureOut">
               <a:rPr lang="en-ZA" smtClean="0"/>
-              <a:t>2024/07/07</a:t>
+              <a:t>2025/02/04</a:t>
             </a:fld>
             <a:endParaRPr lang="en-ZA"/>
           </a:p>
@@ -1859,7 +1859,7 @@
           <a:bodyPr/>
           <a:lstStyle/>
           <a:p>
-            <a:fld id="{E1F98151-497C-4309-A4DD-995DA316A740}" type="slidenum">
+            <a:fld id="{60F2D963-3578-461F-9A93-1ACC367E1CB4}" type="slidenum">
               <a:rPr lang="en-ZA" smtClean="0"/>
               <a:t>‹#›</a:t>
             </a:fld>
@@ -1870,7 +1870,7 @@
     </p:spTree>
     <p:extLst>
       <p:ext uri="{BB962C8B-B14F-4D97-AF65-F5344CB8AC3E}">
-        <p14:creationId xmlns:p14="http://schemas.microsoft.com/office/powerpoint/2010/main" val="761861962"/>
+        <p14:creationId xmlns:p14="http://schemas.microsoft.com/office/powerpoint/2010/main" val="2310103549"/>
       </p:ext>
     </p:extLst>
   </p:cSld>
@@ -2094,9 +2094,9 @@
           <a:bodyPr/>
           <a:lstStyle/>
           <a:p>
-            <a:fld id="{CED249A8-BC37-4AAA-8F05-A3B38DD5A3A3}" type="datetimeFigureOut">
+            <a:fld id="{EC93B6FF-5EEF-4B9E-9617-9E03604E1B7D}" type="datetimeFigureOut">
               <a:rPr lang="en-ZA" smtClean="0"/>
-              <a:t>2024/07/07</a:t>
+              <a:t>2025/02/04</a:t>
             </a:fld>
             <a:endParaRPr lang="en-ZA"/>
           </a:p>
@@ -2136,7 +2136,7 @@
           <a:bodyPr/>
           <a:lstStyle/>
           <a:p>
-            <a:fld id="{E1F98151-497C-4309-A4DD-995DA316A740}" type="slidenum">
+            <a:fld id="{60F2D963-3578-461F-9A93-1ACC367E1CB4}" type="slidenum">
               <a:rPr lang="en-ZA" smtClean="0"/>
               <a:t>‹#›</a:t>
             </a:fld>
@@ -2147,7 +2147,7 @@
     </p:spTree>
     <p:extLst>
       <p:ext uri="{BB962C8B-B14F-4D97-AF65-F5344CB8AC3E}">
-        <p14:creationId xmlns:p14="http://schemas.microsoft.com/office/powerpoint/2010/main" val="951708095"/>
+        <p14:creationId xmlns:p14="http://schemas.microsoft.com/office/powerpoint/2010/main" val="2805081172"/>
       </p:ext>
     </p:extLst>
   </p:cSld>
@@ -2351,9 +2351,9 @@
           <a:bodyPr/>
           <a:lstStyle/>
           <a:p>
-            <a:fld id="{CED249A8-BC37-4AAA-8F05-A3B38DD5A3A3}" type="datetimeFigureOut">
+            <a:fld id="{EC93B6FF-5EEF-4B9E-9617-9E03604E1B7D}" type="datetimeFigureOut">
               <a:rPr lang="en-ZA" smtClean="0"/>
-              <a:t>2024/07/07</a:t>
+              <a:t>2025/02/04</a:t>
             </a:fld>
             <a:endParaRPr lang="en-ZA"/>
           </a:p>
@@ -2393,7 +2393,7 @@
           <a:bodyPr/>
           <a:lstStyle/>
           <a:p>
-            <a:fld id="{E1F98151-497C-4309-A4DD-995DA316A740}" type="slidenum">
+            <a:fld id="{60F2D963-3578-461F-9A93-1ACC367E1CB4}" type="slidenum">
               <a:rPr lang="en-ZA" smtClean="0"/>
               <a:t>‹#›</a:t>
             </a:fld>
@@ -2404,7 +2404,7 @@
     </p:spTree>
     <p:extLst>
       <p:ext uri="{BB962C8B-B14F-4D97-AF65-F5344CB8AC3E}">
-        <p14:creationId xmlns:p14="http://schemas.microsoft.com/office/powerpoint/2010/main" val="928047701"/>
+        <p14:creationId xmlns:p14="http://schemas.microsoft.com/office/powerpoint/2010/main" val="1008539213"/>
       </p:ext>
     </p:extLst>
   </p:cSld>
@@ -2564,9 +2564,9 @@
             </a:lvl1pPr>
           </a:lstStyle>
           <a:p>
-            <a:fld id="{CED249A8-BC37-4AAA-8F05-A3B38DD5A3A3}" type="datetimeFigureOut">
+            <a:fld id="{EC93B6FF-5EEF-4B9E-9617-9E03604E1B7D}" type="datetimeFigureOut">
               <a:rPr lang="en-ZA" smtClean="0"/>
-              <a:t>2024/07/07</a:t>
+              <a:t>2025/02/04</a:t>
             </a:fld>
             <a:endParaRPr lang="en-ZA"/>
           </a:p>
@@ -2642,7 +2642,7 @@
             </a:lvl1pPr>
           </a:lstStyle>
           <a:p>
-            <a:fld id="{E1F98151-497C-4309-A4DD-995DA316A740}" type="slidenum">
+            <a:fld id="{60F2D963-3578-461F-9A93-1ACC367E1CB4}" type="slidenum">
               <a:rPr lang="en-ZA" smtClean="0"/>
               <a:t>‹#›</a:t>
             </a:fld>
@@ -2653,7 +2653,7 @@
     </p:spTree>
     <p:extLst>
       <p:ext uri="{BB962C8B-B14F-4D97-AF65-F5344CB8AC3E}">
-        <p14:creationId xmlns:p14="http://schemas.microsoft.com/office/powerpoint/2010/main" val="696156883"/>
+        <p14:creationId xmlns:p14="http://schemas.microsoft.com/office/powerpoint/2010/main" val="959080525"/>
       </p:ext>
     </p:extLst>
   </p:cSld>
@@ -2971,29 +2971,67 @@
           <a:chExt cx="0" cy="0"/>
         </a:xfrm>
       </p:grpSpPr>
+      <p:sp>
+        <p:nvSpPr>
+          <p:cNvPr id="2" name="Title 1"/>
+          <p:cNvSpPr>
+            <a:spLocks noGrp="1"/>
+          </p:cNvSpPr>
+          <p:nvPr>
+            <p:ph type="ctrTitle"/>
+          </p:nvPr>
+        </p:nvSpPr>
+        <p:spPr/>
+        <p:txBody>
+          <a:bodyPr/>
+          <a:lstStyle/>
+          <a:p>
+            <a:endParaRPr lang="en-ZA"/>
+          </a:p>
+        </p:txBody>
+      </p:sp>
+      <p:sp>
+        <p:nvSpPr>
+          <p:cNvPr id="3" name="Subtitle 2"/>
+          <p:cNvSpPr>
+            <a:spLocks noGrp="1"/>
+          </p:cNvSpPr>
+          <p:nvPr>
+            <p:ph type="subTitle" idx="1"/>
+          </p:nvPr>
+        </p:nvSpPr>
+        <p:spPr/>
+        <p:txBody>
+          <a:bodyPr/>
+          <a:lstStyle/>
+          <a:p>
+            <a:endParaRPr lang="en-ZA"/>
+          </a:p>
+        </p:txBody>
+      </p:sp>
       <p:pic>
         <p:nvPicPr>
-          <p:cNvPr id="6" name="Picture 5"/>
+          <p:cNvPr id="4" name="Picture 3"/>
           <p:cNvPicPr>
             <a:picLocks noChangeAspect="1"/>
           </p:cNvPicPr>
           <p:nvPr/>
         </p:nvPicPr>
         <p:blipFill rotWithShape="1">
-          <a:blip r:embed="rId2" cstate="print">
+          <a:blip r:embed="rId2">
             <a:extLst>
               <a:ext uri="{28A0092B-C50C-407E-A947-70E740481C1C}">
                 <a14:useLocalDpi xmlns:a14="http://schemas.microsoft.com/office/drawing/2010/main" val="0"/>
               </a:ext>
             </a:extLst>
           </a:blip>
-          <a:srcRect b="6089"/>
+          <a:srcRect t="10041" b="52949"/>
           <a:stretch/>
         </p:blipFill>
         <p:spPr>
           <a:xfrm>
-            <a:off x="-4274" y="-1903"/>
-            <a:ext cx="9155353" cy="3304697"/>
+            <a:off x="3347" y="0"/>
+            <a:ext cx="9147347" cy="4803163"/>
           </a:xfrm>
           <a:prstGeom prst="rect">
             <a:avLst/>
@@ -3002,20 +3040,20 @@
       </p:pic>
       <p:sp>
         <p:nvSpPr>
-          <p:cNvPr id="19" name="Rectangle 18"/>
+          <p:cNvPr id="5" name="Rectangle 4"/>
           <p:cNvSpPr/>
           <p:nvPr/>
         </p:nvSpPr>
         <p:spPr>
           <a:xfrm>
-            <a:off x="-4271" y="3302795"/>
-            <a:ext cx="9147347" cy="2846582"/>
+            <a:off x="0" y="4735308"/>
+            <a:ext cx="9147347" cy="1509286"/>
           </a:xfrm>
           <a:prstGeom prst="rect">
             <a:avLst/>
           </a:prstGeom>
           <a:solidFill>
-            <a:srgbClr val="071113"/>
+            <a:srgbClr val="0A0A0A"/>
           </a:solidFill>
           <a:ln>
             <a:noFill/>
@@ -3046,14 +3084,14 @@
       </p:sp>
       <p:sp>
         <p:nvSpPr>
-          <p:cNvPr id="16" name="TextBox 15"/>
+          <p:cNvPr id="6" name="TextBox 5"/>
           <p:cNvSpPr txBox="1"/>
           <p:nvPr/>
         </p:nvSpPr>
         <p:spPr>
           <a:xfrm>
-            <a:off x="1076838" y="3883524"/>
-            <a:ext cx="7599543" cy="584775"/>
+            <a:off x="772228" y="3660970"/>
+            <a:ext cx="7599543" cy="461665"/>
           </a:xfrm>
           <a:prstGeom prst="rect">
             <a:avLst/>
@@ -3066,34 +3104,17 @@
           </a:bodyPr>
           <a:lstStyle/>
           <a:p>
-            <a:r>
-              <a:rPr lang="en-NZ" sz="3200" spc="300" dirty="0">
+            <a:pPr algn="ctr"/>
+            <a:r>
+              <a:rPr lang="en-NZ" sz="2400" spc="300" dirty="0">
                 <a:solidFill>
                   <a:schemeClr val="bg1"/>
                 </a:solidFill>
                 <a:latin typeface="Source Sans 3" panose="020B0303030403020204" pitchFamily="34" charset="0"/>
               </a:rPr>
-              <a:t>SATURDAY </a:t>
-            </a:r>
-            <a:r>
-              <a:rPr lang="en-NZ" sz="3200" spc="300" dirty="0" smtClean="0">
-                <a:solidFill>
-                  <a:schemeClr val="bg1"/>
-                </a:solidFill>
-                <a:latin typeface="Source Sans 3" panose="020B0303030403020204" pitchFamily="34" charset="0"/>
-              </a:rPr>
-              <a:t>05 </a:t>
-            </a:r>
-            <a:r>
-              <a:rPr lang="en-NZ" sz="3200" spc="300" dirty="0" smtClean="0">
-                <a:solidFill>
-                  <a:schemeClr val="bg1"/>
-                </a:solidFill>
-                <a:latin typeface="Source Sans 3" panose="020B0303030403020204" pitchFamily="34" charset="0"/>
-              </a:rPr>
-              <a:t>APRIL 2025</a:t>
-            </a:r>
-            <a:endParaRPr lang="en-NZ" sz="2000" spc="300" dirty="0">
+              <a:t>SATURDAY 28 MARCH 2026</a:t>
+            </a:r>
+            <a:endParaRPr lang="en-NZ" sz="1600" spc="300" dirty="0">
               <a:solidFill>
                 <a:schemeClr val="bg1"/>
               </a:solidFill>
@@ -3104,14 +3125,14 @@
       </p:sp>
       <p:sp>
         <p:nvSpPr>
-          <p:cNvPr id="20" name="TextBox 19"/>
+          <p:cNvPr id="7" name="TextBox 6"/>
           <p:cNvSpPr txBox="1"/>
           <p:nvPr/>
         </p:nvSpPr>
         <p:spPr>
           <a:xfrm>
-            <a:off x="1069719" y="3069811"/>
-            <a:ext cx="5559498" cy="923330"/>
+            <a:off x="1819126" y="2875851"/>
+            <a:ext cx="5559498" cy="830997"/>
           </a:xfrm>
           <a:prstGeom prst="rect">
             <a:avLst/>
@@ -3124,33 +3145,28 @@
           </a:bodyPr>
           <a:lstStyle/>
           <a:p>
-            <a:r>
-              <a:rPr lang="en-NZ" sz="5400" spc="600" dirty="0" smtClean="0">
+            <a:pPr algn="ctr"/>
+            <a:r>
+              <a:rPr lang="en-NZ" sz="4800" spc="600" dirty="0">
                 <a:solidFill>
                   <a:srgbClr val="FEE69A"/>
                 </a:solidFill>
                 <a:latin typeface="Source Sans 3" panose="020B0303030403020204" pitchFamily="34" charset="0"/>
               </a:rPr>
-              <a:t>FAMILY</a:t>
-            </a:r>
-            <a:endParaRPr lang="en-NZ" sz="4800" spc="600" dirty="0">
-              <a:solidFill>
-                <a:srgbClr val="FEE69A"/>
-              </a:solidFill>
-              <a:latin typeface="Source Sans 3" panose="020B0303030403020204" pitchFamily="34" charset="0"/>
-            </a:endParaRPr>
-          </a:p>
-        </p:txBody>
-      </p:sp>
-      <p:sp>
-        <p:nvSpPr>
-          <p:cNvPr id="21" name="TextBox 20"/>
+              <a:t>DISCIPLESHIP</a:t>
+            </a:r>
+          </a:p>
+        </p:txBody>
+      </p:sp>
+      <p:sp>
+        <p:nvSpPr>
+          <p:cNvPr id="8" name="TextBox 7"/>
           <p:cNvSpPr txBox="1"/>
           <p:nvPr/>
         </p:nvSpPr>
         <p:spPr>
           <a:xfrm>
-            <a:off x="389288" y="6287718"/>
+            <a:off x="392635" y="6353251"/>
             <a:ext cx="8412480" cy="400110"/>
           </a:xfrm>
           <a:prstGeom prst="rect">
@@ -3181,16 +3197,25 @@
                 </a:solidFill>
                 <a:latin typeface="Gill Sans MT" panose="020B0502020104020203" pitchFamily="34" charset="0"/>
               </a:rPr>
-              <a:t>– Register for catering by </a:t>
-            </a:r>
-            <a:r>
-              <a:rPr lang="en-NZ" dirty="0" smtClean="0">
+              <a:t>– Register for catering by 23</a:t>
+            </a:r>
+            <a:r>
+              <a:rPr lang="en-NZ" baseline="30000" dirty="0">
                 <a:solidFill>
                   <a:prstClr val="black"/>
                 </a:solidFill>
                 <a:latin typeface="Gill Sans MT" panose="020B0502020104020203" pitchFamily="34" charset="0"/>
               </a:rPr>
-              <a:t>31 March 2025 </a:t>
+              <a:t>rd</a:t>
+            </a:r>
+            <a:r>
+              <a:rPr lang="en-NZ" dirty="0">
+                <a:solidFill>
+                  <a:prstClr val="black"/>
+                </a:solidFill>
+                <a:latin typeface="Gill Sans MT" panose="020B0502020104020203" pitchFamily="34" charset="0"/>
+              </a:rPr>
+              <a:t> March 2026 </a:t>
             </a:r>
             <a:r>
               <a:rPr lang="en-NZ" sz="2000" u="sng" dirty="0">
@@ -3215,14 +3240,109 @@
       </p:sp>
       <p:sp>
         <p:nvSpPr>
-          <p:cNvPr id="12" name="Rectangle 11"/>
+          <p:cNvPr id="9" name="TextBox 8"/>
+          <p:cNvSpPr txBox="1"/>
+          <p:nvPr/>
+        </p:nvSpPr>
+        <p:spPr>
+          <a:xfrm>
+            <a:off x="1303521" y="4573465"/>
+            <a:ext cx="6313695" cy="1477328"/>
+          </a:xfrm>
+          <a:prstGeom prst="rect">
+            <a:avLst/>
+          </a:prstGeom>
+          <a:noFill/>
+        </p:spPr>
+        <p:txBody>
+          <a:bodyPr wrap="square" rtlCol="0">
+            <a:spAutoFit/>
+          </a:bodyPr>
+          <a:lstStyle/>
+          <a:p>
+            <a:pPr algn="ctr" fontAlgn="base"/>
+            <a:r>
+              <a:rPr lang="en-US" dirty="0" smtClean="0">
+                <a:solidFill>
+                  <a:schemeClr val="bg1"/>
+                </a:solidFill>
+                <a:latin typeface="Source Sans 3" panose="020B0303030403020204" pitchFamily="34" charset="0"/>
+              </a:rPr>
+              <a:t>Jesus </a:t>
+            </a:r>
+            <a:r>
+              <a:rPr lang="en-US" dirty="0">
+                <a:solidFill>
+                  <a:schemeClr val="bg1"/>
+                </a:solidFill>
+                <a:latin typeface="Source Sans 3" panose="020B0303030403020204" pitchFamily="34" charset="0"/>
+              </a:rPr>
+              <a:t>told his followers that they were to “make disciples of all the nations”. What does this mean? </a:t>
+            </a:r>
+            <a:endParaRPr lang="en-US" dirty="0" smtClean="0">
+              <a:solidFill>
+                <a:schemeClr val="bg1"/>
+              </a:solidFill>
+              <a:latin typeface="Source Sans 3" panose="020B0303030403020204" pitchFamily="34" charset="0"/>
+            </a:endParaRPr>
+          </a:p>
+          <a:p>
+            <a:pPr algn="ctr" fontAlgn="base"/>
+            <a:endParaRPr lang="en-US" dirty="0" smtClean="0">
+              <a:solidFill>
+                <a:schemeClr val="bg1"/>
+              </a:solidFill>
+              <a:latin typeface="Source Sans 3" panose="020B0303030403020204" pitchFamily="34" charset="0"/>
+            </a:endParaRPr>
+          </a:p>
+          <a:p>
+            <a:pPr algn="ctr" fontAlgn="base"/>
+            <a:r>
+              <a:rPr lang="en-US" dirty="0" smtClean="0">
+                <a:solidFill>
+                  <a:schemeClr val="bg1"/>
+                </a:solidFill>
+                <a:latin typeface="Source Sans 3" panose="020B0303030403020204" pitchFamily="34" charset="0"/>
+              </a:rPr>
+              <a:t>Join </a:t>
+            </a:r>
+            <a:r>
+              <a:rPr lang="en-US" dirty="0">
+                <a:solidFill>
+                  <a:schemeClr val="bg1"/>
+                </a:solidFill>
+                <a:latin typeface="Source Sans 3" panose="020B0303030403020204" pitchFamily="34" charset="0"/>
+              </a:rPr>
+              <a:t>us for Kurios 2026 as we explore what the Great Commission means for the church</a:t>
+            </a:r>
+            <a:r>
+              <a:rPr lang="en-US" dirty="0" smtClean="0">
+                <a:solidFill>
+                  <a:schemeClr val="bg1"/>
+                </a:solidFill>
+                <a:latin typeface="Source Sans 3" panose="020B0303030403020204" pitchFamily="34" charset="0"/>
+              </a:rPr>
+              <a:t>.</a:t>
+            </a:r>
+            <a:endParaRPr lang="en-US" dirty="0" smtClean="0">
+              <a:solidFill>
+                <a:schemeClr val="bg1"/>
+              </a:solidFill>
+              <a:latin typeface="Source Sans 3" panose="020B0303030403020204" pitchFamily="34" charset="0"/>
+            </a:endParaRPr>
+          </a:p>
+        </p:txBody>
+      </p:sp>
+      <p:sp>
+        <p:nvSpPr>
+          <p:cNvPr id="10" name="Rectangle 9"/>
           <p:cNvSpPr/>
           <p:nvPr/>
         </p:nvSpPr>
         <p:spPr>
           <a:xfrm>
-            <a:off x="1062101" y="4476071"/>
-            <a:ext cx="7436859" cy="400110"/>
+            <a:off x="3009852" y="4096005"/>
+            <a:ext cx="2901035" cy="369332"/>
           </a:xfrm>
           <a:prstGeom prst="rect">
             <a:avLst/>
@@ -3234,27 +3354,22 @@
           </a:bodyPr>
           <a:lstStyle/>
           <a:p>
-            <a:r>
-              <a:rPr lang="en-NZ" sz="2000" dirty="0" smtClean="0">
+            <a:pPr algn="ctr"/>
+            <a:r>
+              <a:rPr lang="en-NZ" dirty="0">
                 <a:solidFill>
                   <a:schemeClr val="bg1"/>
                 </a:solidFill>
                 <a:latin typeface="Source Sans 3" panose="020B0303030403020204" pitchFamily="34" charset="0"/>
               </a:rPr>
-              <a:t>9:30am-3:30pm        89 Liardet St, New Plymouth</a:t>
-            </a:r>
-            <a:endParaRPr lang="en-NZ" sz="2000" dirty="0">
-              <a:solidFill>
-                <a:schemeClr val="bg1"/>
-              </a:solidFill>
-              <a:latin typeface="Source Sans 3" panose="020B0303030403020204" pitchFamily="34" charset="0"/>
-            </a:endParaRPr>
+              <a:t>NEW PLYMOUTH</a:t>
+            </a:r>
           </a:p>
         </p:txBody>
       </p:sp>
       <p:pic>
         <p:nvPicPr>
-          <p:cNvPr id="22" name="Picture 21"/>
+          <p:cNvPr id="11" name="Picture 10"/>
           <p:cNvPicPr>
             <a:picLocks noChangeAspect="1"/>
           </p:cNvPicPr>
@@ -3274,8 +3389,8 @@
         </p:blipFill>
         <p:spPr>
           <a:xfrm>
-            <a:off x="5073416" y="1999024"/>
-            <a:ext cx="4163233" cy="1982572"/>
+            <a:off x="61129" y="865607"/>
+            <a:ext cx="5341306" cy="2543582"/>
           </a:xfrm>
           <a:prstGeom prst="rect">
             <a:avLst/>
@@ -3284,14 +3399,14 @@
       </p:pic>
       <p:sp>
         <p:nvSpPr>
-          <p:cNvPr id="26" name="TextBox 25"/>
+          <p:cNvPr id="12" name="TextBox 11"/>
           <p:cNvSpPr txBox="1"/>
           <p:nvPr/>
         </p:nvSpPr>
         <p:spPr>
           <a:xfrm>
-            <a:off x="2880079" y="4589742"/>
-            <a:ext cx="377372" cy="169277"/>
+            <a:off x="654141" y="1396854"/>
+            <a:ext cx="4362450" cy="223138"/>
           </a:xfrm>
           <a:prstGeom prst="rect">
             <a:avLst/>
@@ -3305,47 +3420,7 @@
           <a:lstStyle/>
           <a:p>
             <a:r>
-              <a:rPr lang="en-ZA" sz="500" dirty="0" smtClean="0">
-                <a:solidFill>
-                  <a:schemeClr val="bg1"/>
-                </a:solidFill>
-                <a:latin typeface="Webdings" panose="05030102010509060703" pitchFamily="18" charset="2"/>
-              </a:rPr>
-              <a:t>n</a:t>
-            </a:r>
-            <a:endParaRPr lang="en-ZA" sz="500" dirty="0">
-              <a:solidFill>
-                <a:schemeClr val="bg1"/>
-              </a:solidFill>
-              <a:latin typeface="Webdings" panose="05030102010509060703" pitchFamily="18" charset="2"/>
-            </a:endParaRPr>
-          </a:p>
-        </p:txBody>
-      </p:sp>
-      <p:sp>
-        <p:nvSpPr>
-          <p:cNvPr id="3" name="TextBox 2"/>
-          <p:cNvSpPr txBox="1"/>
-          <p:nvPr/>
-        </p:nvSpPr>
-        <p:spPr>
-          <a:xfrm>
-            <a:off x="5532331" y="2383480"/>
-            <a:ext cx="4362450" cy="192360"/>
-          </a:xfrm>
-          <a:prstGeom prst="rect">
-            <a:avLst/>
-          </a:prstGeom>
-          <a:noFill/>
-        </p:spPr>
-        <p:txBody>
-          <a:bodyPr wrap="square" rtlCol="0">
-            <a:spAutoFit/>
-          </a:bodyPr>
-          <a:lstStyle/>
-          <a:p>
-            <a:r>
-              <a:rPr lang="en-US" sz="650" dirty="0" smtClean="0">
+              <a:rPr lang="en-US" sz="850" dirty="0">
                 <a:solidFill>
                   <a:srgbClr val="FEE69A"/>
                 </a:solidFill>
@@ -3353,7 +3428,7 @@
               </a:rPr>
               <a:t>New Plymouth Reformed Church presents:</a:t>
             </a:r>
-            <a:endParaRPr lang="en-ZA" sz="650" dirty="0">
+            <a:endParaRPr lang="en-ZA" sz="850" dirty="0">
               <a:solidFill>
                 <a:srgbClr val="FEE69A"/>
               </a:solidFill>
@@ -3362,90 +3437,23 @@
           </a:p>
         </p:txBody>
       </p:sp>
-      <p:sp>
-        <p:nvSpPr>
-          <p:cNvPr id="13" name="TextBox 12"/>
-          <p:cNvSpPr txBox="1"/>
-          <p:nvPr/>
-        </p:nvSpPr>
-        <p:spPr>
-          <a:xfrm>
-            <a:off x="1062102" y="4996193"/>
-            <a:ext cx="6677048" cy="707886"/>
-          </a:xfrm>
-          <a:prstGeom prst="rect">
-            <a:avLst/>
-          </a:prstGeom>
-          <a:noFill/>
-        </p:spPr>
-        <p:txBody>
-          <a:bodyPr wrap="square" rtlCol="0">
-            <a:spAutoFit/>
-          </a:bodyPr>
-          <a:lstStyle/>
-          <a:p>
-            <a:pPr fontAlgn="base"/>
-            <a:r>
-              <a:rPr lang="en-US" sz="2000" dirty="0">
-                <a:solidFill>
-                  <a:schemeClr val="bg1"/>
-                </a:solidFill>
-                <a:latin typeface="Source Sans 3" panose="020B0303030403020204" pitchFamily="34" charset="0"/>
-              </a:rPr>
-              <a:t>God intended our families to be a </a:t>
-            </a:r>
-            <a:r>
-              <a:rPr lang="en-US" sz="2000" dirty="0" smtClean="0">
-                <a:solidFill>
-                  <a:schemeClr val="bg1"/>
-                </a:solidFill>
-                <a:latin typeface="Source Sans 3" panose="020B0303030403020204" pitchFamily="34" charset="0"/>
-              </a:rPr>
-              <a:t>blessing. </a:t>
-            </a:r>
-          </a:p>
-          <a:p>
-            <a:pPr fontAlgn="base"/>
-            <a:r>
-              <a:rPr lang="en-US" sz="2000" dirty="0" smtClean="0">
-                <a:solidFill>
-                  <a:schemeClr val="bg1"/>
-                </a:solidFill>
-                <a:latin typeface="Source Sans 3" panose="020B0303030403020204" pitchFamily="34" charset="0"/>
-              </a:rPr>
-              <a:t>How </a:t>
-            </a:r>
-            <a:r>
-              <a:rPr lang="en-US" sz="2000" dirty="0">
-                <a:solidFill>
-                  <a:schemeClr val="bg1"/>
-                </a:solidFill>
-                <a:latin typeface="Source Sans 3" panose="020B0303030403020204" pitchFamily="34" charset="0"/>
-              </a:rPr>
-              <a:t>can we reclaim them for his glory</a:t>
-            </a:r>
-            <a:r>
-              <a:rPr lang="en-US" sz="2000" dirty="0" smtClean="0">
-                <a:solidFill>
-                  <a:schemeClr val="bg1"/>
-                </a:solidFill>
-                <a:latin typeface="Source Sans 3" panose="020B0303030403020204" pitchFamily="34" charset="0"/>
-              </a:rPr>
-              <a:t>?</a:t>
-            </a:r>
-          </a:p>
-        </p:txBody>
-      </p:sp>
     </p:spTree>
     <p:extLst>
       <p:ext uri="{BB962C8B-B14F-4D97-AF65-F5344CB8AC3E}">
-        <p14:creationId xmlns:p14="http://schemas.microsoft.com/office/powerpoint/2010/main" val="678873996"/>
+        <p14:creationId xmlns:p14="http://schemas.microsoft.com/office/powerpoint/2010/main" val="2845447593"/>
       </p:ext>
     </p:extLst>
   </p:cSld>
   <p:clrMapOvr>
     <a:masterClrMapping/>
   </p:clrMapOvr>
+  <p:timing>
+    <p:tnLst>
+      <p:par>
+        <p:cTn id="1" dur="indefinite" restart="never" nodeType="tmRoot"/>
+      </p:par>
+    </p:tnLst>
+  </p:timing>
 </p:sld>
 </file>
 

</xml_diff>